<commit_message>
Switch to bottle in slides
</commit_message>
<xml_diff>
--- a/Python Level 2/Lesson 8/Session 8.pptx
+++ b/Python Level 2/Lesson 8/Session 8.pptx
@@ -210,7 +210,7 @@
           <a:p>
             <a:fld id="{77C30FF8-0303-4F4D-81BC-5EB2E73F8664}" type="datetimeFigureOut">
               <a:rPr lang="en-US" smtClean="0"/>
-              <a:t>11/7/16</a:t>
+              <a:t>3/17/19</a:t>
             </a:fld>
             <a:endParaRPr lang="en-US"/>
           </a:p>
@@ -274,38 +274,37 @@
           <a:p>
             <a:pPr lvl="0"/>
             <a:r>
-              <a:rPr lang="en-US" smtClean="0"/>
+              <a:rPr lang="en-US"/>
               <a:t>Click to edit Master text styles</a:t>
             </a:r>
           </a:p>
           <a:p>
             <a:pPr lvl="1"/>
             <a:r>
-              <a:rPr lang="en-US" smtClean="0"/>
+              <a:rPr lang="en-US"/>
               <a:t>Second level</a:t>
             </a:r>
           </a:p>
           <a:p>
             <a:pPr lvl="2"/>
             <a:r>
-              <a:rPr lang="en-US" smtClean="0"/>
+              <a:rPr lang="en-US"/>
               <a:t>Third level</a:t>
             </a:r>
           </a:p>
           <a:p>
             <a:pPr lvl="3"/>
             <a:r>
-              <a:rPr lang="en-US" smtClean="0"/>
+              <a:rPr lang="en-US"/>
               <a:t>Fourth level</a:t>
             </a:r>
           </a:p>
           <a:p>
             <a:pPr lvl="4"/>
             <a:r>
-              <a:rPr lang="en-US" smtClean="0"/>
+              <a:rPr lang="en-US"/>
               <a:t>Fifth level</a:t>
             </a:r>
-            <a:endParaRPr lang="en-US"/>
           </a:p>
         </p:txBody>
       </p:sp>
@@ -607,27 +606,27 @@
           <a:lstStyle/>
           <a:p>
             <a:r>
-              <a:rPr lang="en-US" dirty="0" smtClean="0"/>
+              <a:rPr lang="en-US" dirty="0"/>
               <a:t>This is </a:t>
             </a:r>
             <a:r>
-              <a:rPr lang="en-US" dirty="0" err="1" smtClean="0"/>
+              <a:rPr lang="en-US" dirty="0" err="1"/>
               <a:t>xml_reader</a:t>
             </a:r>
             <a:r>
-              <a:rPr lang="en-US" baseline="0" dirty="0" err="1" smtClean="0"/>
+              <a:rPr lang="en-US" baseline="0" dirty="0" err="1"/>
               <a:t>.py</a:t>
             </a:r>
             <a:r>
-              <a:rPr lang="en-US" baseline="0" dirty="0" smtClean="0"/>
+              <a:rPr lang="en-US" baseline="0" dirty="0"/>
               <a:t> from the examples directory. Take a look at what happens if we try to read the other xml files. We might need the </a:t>
             </a:r>
             <a:r>
-              <a:rPr lang="en-US" baseline="0" dirty="0" err="1" smtClean="0"/>
+              <a:rPr lang="en-US" baseline="0" dirty="0" err="1"/>
               <a:t>subelement.attrib</a:t>
             </a:r>
             <a:r>
-              <a:rPr lang="en-US" baseline="0" dirty="0" smtClean="0"/>
+              <a:rPr lang="en-US" baseline="0" dirty="0"/>
               <a:t> property</a:t>
             </a:r>
             <a:endParaRPr lang="en-US" dirty="0"/>
@@ -715,11 +714,11 @@
           <a:lstStyle/>
           <a:p>
             <a:r>
-              <a:rPr lang="en-US" dirty="0" smtClean="0"/>
+              <a:rPr lang="en-US" dirty="0"/>
               <a:t>Have</a:t>
             </a:r>
             <a:r>
-              <a:rPr lang="en-US" baseline="0" dirty="0" smtClean="0"/>
+              <a:rPr lang="en-US" baseline="0" dirty="0"/>
               <a:t> a go at writing a parser for example 3</a:t>
             </a:r>
             <a:endParaRPr lang="en-US" dirty="0"/>
@@ -807,10 +806,9 @@
           <a:lstStyle/>
           <a:p>
             <a:r>
-              <a:rPr lang="en-US" dirty="0" smtClean="0"/>
+              <a:rPr lang="en-US" dirty="0"/>
               <a:t>The great thing about standards is of course that there are so many of them.</a:t>
             </a:r>
-            <a:endParaRPr lang="en-US" dirty="0"/>
           </a:p>
         </p:txBody>
       </p:sp>
@@ -976,10 +974,9 @@
           </a:lstStyle>
           <a:p>
             <a:r>
-              <a:rPr lang="en-US" smtClean="0"/>
+              <a:rPr lang="en-US"/>
               <a:t>Click to edit Master title style</a:t>
             </a:r>
-            <a:endParaRPr lang="en-US"/>
           </a:p>
         </p:txBody>
       </p:sp>
@@ -1041,10 +1038,9 @@
           </a:lstStyle>
           <a:p>
             <a:r>
-              <a:rPr lang="en-US" smtClean="0"/>
+              <a:rPr lang="en-US"/>
               <a:t>Click to edit Master subtitle style</a:t>
             </a:r>
-            <a:endParaRPr lang="en-US"/>
           </a:p>
         </p:txBody>
       </p:sp>
@@ -1065,7 +1061,7 @@
           <a:p>
             <a:fld id="{86984813-33F6-9F40-A25F-D5C0CA50E5AD}" type="datetimeFigureOut">
               <a:rPr lang="en-US" smtClean="0"/>
-              <a:t>11/7/16</a:t>
+              <a:t>3/17/19</a:t>
             </a:fld>
             <a:endParaRPr lang="en-US"/>
           </a:p>
@@ -1159,10 +1155,9 @@
           <a:lstStyle/>
           <a:p>
             <a:r>
-              <a:rPr lang="en-US" smtClean="0"/>
+              <a:rPr lang="en-US"/>
               <a:t>Click to edit Master title style</a:t>
             </a:r>
-            <a:endParaRPr lang="en-US"/>
           </a:p>
         </p:txBody>
       </p:sp>
@@ -1183,38 +1178,37 @@
           <a:p>
             <a:pPr lvl="0"/>
             <a:r>
-              <a:rPr lang="en-US" smtClean="0"/>
+              <a:rPr lang="en-US"/>
               <a:t>Click to edit Master text styles</a:t>
             </a:r>
           </a:p>
           <a:p>
             <a:pPr lvl="1"/>
             <a:r>
-              <a:rPr lang="en-US" smtClean="0"/>
+              <a:rPr lang="en-US"/>
               <a:t>Second level</a:t>
             </a:r>
           </a:p>
           <a:p>
             <a:pPr lvl="2"/>
             <a:r>
-              <a:rPr lang="en-US" smtClean="0"/>
+              <a:rPr lang="en-US"/>
               <a:t>Third level</a:t>
             </a:r>
           </a:p>
           <a:p>
             <a:pPr lvl="3"/>
             <a:r>
-              <a:rPr lang="en-US" smtClean="0"/>
+              <a:rPr lang="en-US"/>
               <a:t>Fourth level</a:t>
             </a:r>
           </a:p>
           <a:p>
             <a:pPr lvl="4"/>
             <a:r>
-              <a:rPr lang="en-US" smtClean="0"/>
+              <a:rPr lang="en-US"/>
               <a:t>Fifth level</a:t>
             </a:r>
-            <a:endParaRPr lang="en-US"/>
           </a:p>
         </p:txBody>
       </p:sp>
@@ -1235,7 +1229,7 @@
           <a:p>
             <a:fld id="{86984813-33F6-9F40-A25F-D5C0CA50E5AD}" type="datetimeFigureOut">
               <a:rPr lang="en-US" smtClean="0"/>
-              <a:t>11/7/16</a:t>
+              <a:t>3/17/19</a:t>
             </a:fld>
             <a:endParaRPr lang="en-US"/>
           </a:p>
@@ -1334,10 +1328,9 @@
           <a:lstStyle/>
           <a:p>
             <a:r>
-              <a:rPr lang="en-US" smtClean="0"/>
+              <a:rPr lang="en-US"/>
               <a:t>Click to edit Master title style</a:t>
             </a:r>
-            <a:endParaRPr lang="en-US"/>
           </a:p>
         </p:txBody>
       </p:sp>
@@ -1363,38 +1356,37 @@
           <a:p>
             <a:pPr lvl="0"/>
             <a:r>
-              <a:rPr lang="en-US" smtClean="0"/>
+              <a:rPr lang="en-US"/>
               <a:t>Click to edit Master text styles</a:t>
             </a:r>
           </a:p>
           <a:p>
             <a:pPr lvl="1"/>
             <a:r>
-              <a:rPr lang="en-US" smtClean="0"/>
+              <a:rPr lang="en-US"/>
               <a:t>Second level</a:t>
             </a:r>
           </a:p>
           <a:p>
             <a:pPr lvl="2"/>
             <a:r>
-              <a:rPr lang="en-US" smtClean="0"/>
+              <a:rPr lang="en-US"/>
               <a:t>Third level</a:t>
             </a:r>
           </a:p>
           <a:p>
             <a:pPr lvl="3"/>
             <a:r>
-              <a:rPr lang="en-US" smtClean="0"/>
+              <a:rPr lang="en-US"/>
               <a:t>Fourth level</a:t>
             </a:r>
           </a:p>
           <a:p>
             <a:pPr lvl="4"/>
             <a:r>
-              <a:rPr lang="en-US" smtClean="0"/>
+              <a:rPr lang="en-US"/>
               <a:t>Fifth level</a:t>
             </a:r>
-            <a:endParaRPr lang="en-US"/>
           </a:p>
         </p:txBody>
       </p:sp>
@@ -1415,7 +1407,7 @@
           <a:p>
             <a:fld id="{86984813-33F6-9F40-A25F-D5C0CA50E5AD}" type="datetimeFigureOut">
               <a:rPr lang="en-US" smtClean="0"/>
-              <a:t>11/7/16</a:t>
+              <a:t>3/17/19</a:t>
             </a:fld>
             <a:endParaRPr lang="en-US"/>
           </a:p>
@@ -1509,10 +1501,9 @@
           <a:lstStyle/>
           <a:p>
             <a:r>
-              <a:rPr lang="en-US" smtClean="0"/>
+              <a:rPr lang="en-US"/>
               <a:t>Click to edit Master title style</a:t>
             </a:r>
-            <a:endParaRPr lang="en-US"/>
           </a:p>
         </p:txBody>
       </p:sp>
@@ -1533,38 +1524,37 @@
           <a:p>
             <a:pPr lvl="0"/>
             <a:r>
-              <a:rPr lang="en-US" smtClean="0"/>
+              <a:rPr lang="en-US"/>
               <a:t>Click to edit Master text styles</a:t>
             </a:r>
           </a:p>
           <a:p>
             <a:pPr lvl="1"/>
             <a:r>
-              <a:rPr lang="en-US" smtClean="0"/>
+              <a:rPr lang="en-US"/>
               <a:t>Second level</a:t>
             </a:r>
           </a:p>
           <a:p>
             <a:pPr lvl="2"/>
             <a:r>
-              <a:rPr lang="en-US" smtClean="0"/>
+              <a:rPr lang="en-US"/>
               <a:t>Third level</a:t>
             </a:r>
           </a:p>
           <a:p>
             <a:pPr lvl="3"/>
             <a:r>
-              <a:rPr lang="en-US" smtClean="0"/>
+              <a:rPr lang="en-US"/>
               <a:t>Fourth level</a:t>
             </a:r>
           </a:p>
           <a:p>
             <a:pPr lvl="4"/>
             <a:r>
-              <a:rPr lang="en-US" smtClean="0"/>
+              <a:rPr lang="en-US"/>
               <a:t>Fifth level</a:t>
             </a:r>
-            <a:endParaRPr lang="en-US"/>
           </a:p>
         </p:txBody>
       </p:sp>
@@ -1585,7 +1575,7 @@
           <a:p>
             <a:fld id="{86984813-33F6-9F40-A25F-D5C0CA50E5AD}" type="datetimeFigureOut">
               <a:rPr lang="en-US" smtClean="0"/>
-              <a:t>11/7/16</a:t>
+              <a:t>3/17/19</a:t>
             </a:fld>
             <a:endParaRPr lang="en-US"/>
           </a:p>
@@ -1688,10 +1678,9 @@
           </a:lstStyle>
           <a:p>
             <a:r>
-              <a:rPr lang="en-US" smtClean="0"/>
+              <a:rPr lang="en-US"/>
               <a:t>Click to edit Master title style</a:t>
             </a:r>
-            <a:endParaRPr lang="en-US"/>
           </a:p>
         </p:txBody>
       </p:sp>
@@ -1808,7 +1797,7 @@
           <a:p>
             <a:pPr lvl="0"/>
             <a:r>
-              <a:rPr lang="en-US" smtClean="0"/>
+              <a:rPr lang="en-US"/>
               <a:t>Click to edit Master text styles</a:t>
             </a:r>
           </a:p>
@@ -1831,7 +1820,7 @@
           <a:p>
             <a:fld id="{86984813-33F6-9F40-A25F-D5C0CA50E5AD}" type="datetimeFigureOut">
               <a:rPr lang="en-US" smtClean="0"/>
-              <a:t>11/7/16</a:t>
+              <a:t>3/17/19</a:t>
             </a:fld>
             <a:endParaRPr lang="en-US"/>
           </a:p>
@@ -1925,10 +1914,9 @@
           <a:lstStyle/>
           <a:p>
             <a:r>
-              <a:rPr lang="en-US" smtClean="0"/>
+              <a:rPr lang="en-US"/>
               <a:t>Click to edit Master title style</a:t>
             </a:r>
-            <a:endParaRPr lang="en-US"/>
           </a:p>
         </p:txBody>
       </p:sp>
@@ -1954,38 +1942,37 @@
           <a:p>
             <a:pPr lvl="0"/>
             <a:r>
-              <a:rPr lang="en-US" smtClean="0"/>
+              <a:rPr lang="en-US"/>
               <a:t>Click to edit Master text styles</a:t>
             </a:r>
           </a:p>
           <a:p>
             <a:pPr lvl="1"/>
             <a:r>
-              <a:rPr lang="en-US" smtClean="0"/>
+              <a:rPr lang="en-US"/>
               <a:t>Second level</a:t>
             </a:r>
           </a:p>
           <a:p>
             <a:pPr lvl="2"/>
             <a:r>
-              <a:rPr lang="en-US" smtClean="0"/>
+              <a:rPr lang="en-US"/>
               <a:t>Third level</a:t>
             </a:r>
           </a:p>
           <a:p>
             <a:pPr lvl="3"/>
             <a:r>
-              <a:rPr lang="en-US" smtClean="0"/>
+              <a:rPr lang="en-US"/>
               <a:t>Fourth level</a:t>
             </a:r>
           </a:p>
           <a:p>
             <a:pPr lvl="4"/>
             <a:r>
-              <a:rPr lang="en-US" smtClean="0"/>
+              <a:rPr lang="en-US"/>
               <a:t>Fifth level</a:t>
             </a:r>
-            <a:endParaRPr lang="en-US"/>
           </a:p>
         </p:txBody>
       </p:sp>
@@ -2011,38 +1998,37 @@
           <a:p>
             <a:pPr lvl="0"/>
             <a:r>
-              <a:rPr lang="en-US" smtClean="0"/>
+              <a:rPr lang="en-US"/>
               <a:t>Click to edit Master text styles</a:t>
             </a:r>
           </a:p>
           <a:p>
             <a:pPr lvl="1"/>
             <a:r>
-              <a:rPr lang="en-US" smtClean="0"/>
+              <a:rPr lang="en-US"/>
               <a:t>Second level</a:t>
             </a:r>
           </a:p>
           <a:p>
             <a:pPr lvl="2"/>
             <a:r>
-              <a:rPr lang="en-US" smtClean="0"/>
+              <a:rPr lang="en-US"/>
               <a:t>Third level</a:t>
             </a:r>
           </a:p>
           <a:p>
             <a:pPr lvl="3"/>
             <a:r>
-              <a:rPr lang="en-US" smtClean="0"/>
+              <a:rPr lang="en-US"/>
               <a:t>Fourth level</a:t>
             </a:r>
           </a:p>
           <a:p>
             <a:pPr lvl="4"/>
             <a:r>
-              <a:rPr lang="en-US" smtClean="0"/>
+              <a:rPr lang="en-US"/>
               <a:t>Fifth level</a:t>
             </a:r>
-            <a:endParaRPr lang="en-US"/>
           </a:p>
         </p:txBody>
       </p:sp>
@@ -2063,7 +2049,7 @@
           <a:p>
             <a:fld id="{86984813-33F6-9F40-A25F-D5C0CA50E5AD}" type="datetimeFigureOut">
               <a:rPr lang="en-US" smtClean="0"/>
-              <a:t>11/7/16</a:t>
+              <a:t>3/17/19</a:t>
             </a:fld>
             <a:endParaRPr lang="en-US"/>
           </a:p>
@@ -2162,10 +2148,9 @@
           <a:lstStyle/>
           <a:p>
             <a:r>
-              <a:rPr lang="en-US" smtClean="0"/>
+              <a:rPr lang="en-US"/>
               <a:t>Click to edit Master title style</a:t>
             </a:r>
-            <a:endParaRPr lang="en-US"/>
           </a:p>
         </p:txBody>
       </p:sp>
@@ -2228,7 +2213,7 @@
           <a:p>
             <a:pPr lvl="0"/>
             <a:r>
-              <a:rPr lang="en-US" smtClean="0"/>
+              <a:rPr lang="en-US"/>
               <a:t>Click to edit Master text styles</a:t>
             </a:r>
           </a:p>
@@ -2256,38 +2241,37 @@
           <a:p>
             <a:pPr lvl="0"/>
             <a:r>
-              <a:rPr lang="en-US" smtClean="0"/>
+              <a:rPr lang="en-US"/>
               <a:t>Click to edit Master text styles</a:t>
             </a:r>
           </a:p>
           <a:p>
             <a:pPr lvl="1"/>
             <a:r>
-              <a:rPr lang="en-US" smtClean="0"/>
+              <a:rPr lang="en-US"/>
               <a:t>Second level</a:t>
             </a:r>
           </a:p>
           <a:p>
             <a:pPr lvl="2"/>
             <a:r>
-              <a:rPr lang="en-US" smtClean="0"/>
+              <a:rPr lang="en-US"/>
               <a:t>Third level</a:t>
             </a:r>
           </a:p>
           <a:p>
             <a:pPr lvl="3"/>
             <a:r>
-              <a:rPr lang="en-US" smtClean="0"/>
+              <a:rPr lang="en-US"/>
               <a:t>Fourth level</a:t>
             </a:r>
           </a:p>
           <a:p>
             <a:pPr lvl="4"/>
             <a:r>
-              <a:rPr lang="en-US" smtClean="0"/>
+              <a:rPr lang="en-US"/>
               <a:t>Fifth level</a:t>
             </a:r>
-            <a:endParaRPr lang="en-US"/>
           </a:p>
         </p:txBody>
       </p:sp>
@@ -2350,7 +2334,7 @@
           <a:p>
             <a:pPr lvl="0"/>
             <a:r>
-              <a:rPr lang="en-US" smtClean="0"/>
+              <a:rPr lang="en-US"/>
               <a:t>Click to edit Master text styles</a:t>
             </a:r>
           </a:p>
@@ -2378,38 +2362,37 @@
           <a:p>
             <a:pPr lvl="0"/>
             <a:r>
-              <a:rPr lang="en-US" smtClean="0"/>
+              <a:rPr lang="en-US"/>
               <a:t>Click to edit Master text styles</a:t>
             </a:r>
           </a:p>
           <a:p>
             <a:pPr lvl="1"/>
             <a:r>
-              <a:rPr lang="en-US" smtClean="0"/>
+              <a:rPr lang="en-US"/>
               <a:t>Second level</a:t>
             </a:r>
           </a:p>
           <a:p>
             <a:pPr lvl="2"/>
             <a:r>
-              <a:rPr lang="en-US" smtClean="0"/>
+              <a:rPr lang="en-US"/>
               <a:t>Third level</a:t>
             </a:r>
           </a:p>
           <a:p>
             <a:pPr lvl="3"/>
             <a:r>
-              <a:rPr lang="en-US" smtClean="0"/>
+              <a:rPr lang="en-US"/>
               <a:t>Fourth level</a:t>
             </a:r>
           </a:p>
           <a:p>
             <a:pPr lvl="4"/>
             <a:r>
-              <a:rPr lang="en-US" smtClean="0"/>
+              <a:rPr lang="en-US"/>
               <a:t>Fifth level</a:t>
             </a:r>
-            <a:endParaRPr lang="en-US"/>
           </a:p>
         </p:txBody>
       </p:sp>
@@ -2430,7 +2413,7 @@
           <a:p>
             <a:fld id="{86984813-33F6-9F40-A25F-D5C0CA50E5AD}" type="datetimeFigureOut">
               <a:rPr lang="en-US" smtClean="0"/>
-              <a:t>11/7/16</a:t>
+              <a:t>3/17/19</a:t>
             </a:fld>
             <a:endParaRPr lang="en-US"/>
           </a:p>
@@ -2524,10 +2507,9 @@
           <a:lstStyle/>
           <a:p>
             <a:r>
-              <a:rPr lang="en-US" smtClean="0"/>
+              <a:rPr lang="en-US"/>
               <a:t>Click to edit Master title style</a:t>
             </a:r>
-            <a:endParaRPr lang="en-US"/>
           </a:p>
         </p:txBody>
       </p:sp>
@@ -2548,7 +2530,7 @@
           <a:p>
             <a:fld id="{86984813-33F6-9F40-A25F-D5C0CA50E5AD}" type="datetimeFigureOut">
               <a:rPr lang="en-US" smtClean="0"/>
-              <a:t>11/7/16</a:t>
+              <a:t>3/17/19</a:t>
             </a:fld>
             <a:endParaRPr lang="en-US"/>
           </a:p>
@@ -2643,7 +2625,7 @@
           <a:p>
             <a:fld id="{86984813-33F6-9F40-A25F-D5C0CA50E5AD}" type="datetimeFigureOut">
               <a:rPr lang="en-US" smtClean="0"/>
-              <a:t>11/7/16</a:t>
+              <a:t>3/17/19</a:t>
             </a:fld>
             <a:endParaRPr lang="en-US"/>
           </a:p>
@@ -2746,10 +2728,9 @@
           </a:lstStyle>
           <a:p>
             <a:r>
-              <a:rPr lang="en-US" smtClean="0"/>
+              <a:rPr lang="en-US"/>
               <a:t>Click to edit Master title style</a:t>
             </a:r>
-            <a:endParaRPr lang="en-US"/>
           </a:p>
         </p:txBody>
       </p:sp>
@@ -2803,38 +2784,37 @@
           <a:p>
             <a:pPr lvl="0"/>
             <a:r>
-              <a:rPr lang="en-US" smtClean="0"/>
+              <a:rPr lang="en-US"/>
               <a:t>Click to edit Master text styles</a:t>
             </a:r>
           </a:p>
           <a:p>
             <a:pPr lvl="1"/>
             <a:r>
-              <a:rPr lang="en-US" smtClean="0"/>
+              <a:rPr lang="en-US"/>
               <a:t>Second level</a:t>
             </a:r>
           </a:p>
           <a:p>
             <a:pPr lvl="2"/>
             <a:r>
-              <a:rPr lang="en-US" smtClean="0"/>
+              <a:rPr lang="en-US"/>
               <a:t>Third level</a:t>
             </a:r>
           </a:p>
           <a:p>
             <a:pPr lvl="3"/>
             <a:r>
-              <a:rPr lang="en-US" smtClean="0"/>
+              <a:rPr lang="en-US"/>
               <a:t>Fourth level</a:t>
             </a:r>
           </a:p>
           <a:p>
             <a:pPr lvl="4"/>
             <a:r>
-              <a:rPr lang="en-US" smtClean="0"/>
+              <a:rPr lang="en-US"/>
               <a:t>Fifth level</a:t>
             </a:r>
-            <a:endParaRPr lang="en-US"/>
           </a:p>
         </p:txBody>
       </p:sp>
@@ -2897,7 +2877,7 @@
           <a:p>
             <a:pPr lvl="0"/>
             <a:r>
-              <a:rPr lang="en-US" smtClean="0"/>
+              <a:rPr lang="en-US"/>
               <a:t>Click to edit Master text styles</a:t>
             </a:r>
           </a:p>
@@ -2920,7 +2900,7 @@
           <a:p>
             <a:fld id="{86984813-33F6-9F40-A25F-D5C0CA50E5AD}" type="datetimeFigureOut">
               <a:rPr lang="en-US" smtClean="0"/>
-              <a:t>11/7/16</a:t>
+              <a:t>3/17/19</a:t>
             </a:fld>
             <a:endParaRPr lang="en-US"/>
           </a:p>
@@ -3023,10 +3003,9 @@
           </a:lstStyle>
           <a:p>
             <a:r>
-              <a:rPr lang="en-US" smtClean="0"/>
+              <a:rPr lang="en-US"/>
               <a:t>Click to edit Master title style</a:t>
             </a:r>
-            <a:endParaRPr lang="en-US"/>
           </a:p>
         </p:txBody>
       </p:sp>
@@ -3150,7 +3129,7 @@
           <a:p>
             <a:pPr lvl="0"/>
             <a:r>
-              <a:rPr lang="en-US" smtClean="0"/>
+              <a:rPr lang="en-US"/>
               <a:t>Click to edit Master text styles</a:t>
             </a:r>
           </a:p>
@@ -3173,7 +3152,7 @@
           <a:p>
             <a:fld id="{86984813-33F6-9F40-A25F-D5C0CA50E5AD}" type="datetimeFigureOut">
               <a:rPr lang="en-US" smtClean="0"/>
-              <a:t>11/7/16</a:t>
+              <a:t>3/17/19</a:t>
             </a:fld>
             <a:endParaRPr lang="en-US"/>
           </a:p>
@@ -3282,10 +3261,9 @@
           <a:lstStyle/>
           <a:p>
             <a:r>
-              <a:rPr lang="en-US" smtClean="0"/>
+              <a:rPr lang="en-US"/>
               <a:t>Click to edit Master title style</a:t>
             </a:r>
-            <a:endParaRPr lang="en-US"/>
           </a:p>
         </p:txBody>
       </p:sp>
@@ -3316,38 +3294,37 @@
           <a:p>
             <a:pPr lvl="0"/>
             <a:r>
-              <a:rPr lang="en-US" smtClean="0"/>
+              <a:rPr lang="en-US"/>
               <a:t>Click to edit Master text styles</a:t>
             </a:r>
           </a:p>
           <a:p>
             <a:pPr lvl="1"/>
             <a:r>
-              <a:rPr lang="en-US" smtClean="0"/>
+              <a:rPr lang="en-US"/>
               <a:t>Second level</a:t>
             </a:r>
           </a:p>
           <a:p>
             <a:pPr lvl="2"/>
             <a:r>
-              <a:rPr lang="en-US" smtClean="0"/>
+              <a:rPr lang="en-US"/>
               <a:t>Third level</a:t>
             </a:r>
           </a:p>
           <a:p>
             <a:pPr lvl="3"/>
             <a:r>
-              <a:rPr lang="en-US" smtClean="0"/>
+              <a:rPr lang="en-US"/>
               <a:t>Fourth level</a:t>
             </a:r>
           </a:p>
           <a:p>
             <a:pPr lvl="4"/>
             <a:r>
-              <a:rPr lang="en-US" smtClean="0"/>
+              <a:rPr lang="en-US"/>
               <a:t>Fifth level</a:t>
             </a:r>
-            <a:endParaRPr lang="en-US"/>
           </a:p>
         </p:txBody>
       </p:sp>
@@ -3386,7 +3363,7 @@
           <a:p>
             <a:fld id="{86984813-33F6-9F40-A25F-D5C0CA50E5AD}" type="datetimeFigureOut">
               <a:rPr lang="en-US" smtClean="0"/>
-              <a:t>11/7/16</a:t>
+              <a:t>3/17/19</a:t>
             </a:fld>
             <a:endParaRPr lang="en-US"/>
           </a:p>
@@ -3901,10 +3878,9 @@
           </a:lstStyle>
           <a:p>
             <a:r>
-              <a:rPr lang="en-US" sz="4000" dirty="0" smtClean="0"/>
+              <a:rPr lang="en-US" sz="4000" dirty="0"/>
               <a:t>Python Level 2</a:t>
             </a:r>
-            <a:endParaRPr lang="en-US" sz="4000" dirty="0"/>
           </a:p>
         </p:txBody>
       </p:sp>
@@ -3932,10 +3908,9 @@
           <a:p>
             <a:pPr algn="ctr"/>
             <a:r>
-              <a:rPr lang="en-US" sz="2800" dirty="0" smtClean="0"/>
+              <a:rPr lang="en-US" sz="2800" dirty="0"/>
               <a:t>Lesson 8: What kind of day has it been?</a:t>
             </a:r>
-            <a:endParaRPr lang="en-US" sz="2800" dirty="0"/>
           </a:p>
         </p:txBody>
       </p:sp>
@@ -3949,13 +3924,6 @@
   <p:clrMapOvr>
     <a:masterClrMapping/>
   </p:clrMapOvr>
-  <p:timing>
-    <p:tnLst>
-      <p:par>
-        <p:cTn id="1" dur="indefinite" restart="never" nodeType="tmRoot"/>
-      </p:par>
-    </p:tnLst>
-  </p:timing>
 </p:sld>
 </file>
 
@@ -3993,10 +3961,9 @@
           <a:p>
             <a:pPr algn="ctr"/>
             <a:r>
-              <a:rPr lang="en-US" dirty="0" smtClean="0"/>
+              <a:rPr lang="en-US" dirty="0"/>
               <a:t>TCP Sockets</a:t>
             </a:r>
-            <a:endParaRPr lang="en-US" dirty="0"/>
           </a:p>
         </p:txBody>
       </p:sp>
@@ -4069,13 +4036,6 @@
   <p:clrMapOvr>
     <a:masterClrMapping/>
   </p:clrMapOvr>
-  <p:timing>
-    <p:tnLst>
-      <p:par>
-        <p:cTn id="1" dur="indefinite" restart="never" nodeType="tmRoot"/>
-      </p:par>
-    </p:tnLst>
-  </p:timing>
 </p:sld>
 </file>
 
@@ -4113,71 +4073,62 @@
           <a:p>
             <a:pPr algn="ctr"/>
             <a:r>
-              <a:rPr lang="en-US" dirty="0" smtClean="0"/>
+              <a:rPr lang="en-US" dirty="0"/>
               <a:t>UI is King</a:t>
             </a:r>
+          </a:p>
+        </p:txBody>
+      </p:sp>
+      <p:sp>
+        <p:nvSpPr>
+          <p:cNvPr id="3" name="Content Placeholder 2"/>
+          <p:cNvSpPr>
+            <a:spLocks noGrp="1"/>
+          </p:cNvSpPr>
+          <p:nvPr>
+            <p:ph idx="1"/>
+          </p:nvPr>
+        </p:nvSpPr>
+        <p:spPr/>
+        <p:txBody>
+          <a:bodyPr/>
+          <a:lstStyle/>
+          <a:p>
+            <a:r>
+              <a:rPr lang="en-US" dirty="0"/>
+              <a:t>Introducing Trip Deviser! The next big thing in social review sites</a:t>
+            </a:r>
+          </a:p>
+          <a:p>
             <a:endParaRPr lang="en-US" dirty="0"/>
           </a:p>
-        </p:txBody>
-      </p:sp>
-      <p:sp>
-        <p:nvSpPr>
-          <p:cNvPr id="3" name="Content Placeholder 2"/>
-          <p:cNvSpPr>
-            <a:spLocks noGrp="1"/>
-          </p:cNvSpPr>
-          <p:nvPr>
-            <p:ph idx="1"/>
-          </p:nvPr>
-        </p:nvSpPr>
-        <p:spPr/>
-        <p:txBody>
-          <a:bodyPr/>
-          <a:lstStyle/>
-          <a:p>
-            <a:r>
-              <a:rPr lang="en-US" dirty="0" smtClean="0"/>
-              <a:t>Introducing </a:t>
-            </a:r>
-            <a:r>
-              <a:rPr lang="en-US" dirty="0" smtClean="0"/>
-              <a:t>Trip Deviser</a:t>
-            </a:r>
-            <a:r>
-              <a:rPr lang="en-US" dirty="0" smtClean="0"/>
-              <a:t>! The next big thing in social review sites</a:t>
-            </a:r>
-          </a:p>
-          <a:p>
-            <a:endParaRPr lang="en-US" dirty="0"/>
-          </a:p>
-          <a:p>
-            <a:r>
-              <a:rPr lang="en-US" dirty="0" smtClean="0"/>
+          <a:p>
+            <a:r>
+              <a:rPr lang="en-US" dirty="0"/>
               <a:t>Download the files from </a:t>
             </a:r>
             <a:r>
-              <a:rPr lang="en-US" dirty="0" smtClean="0">
+              <a:rPr lang="en-US" dirty="0">
                 <a:hlinkClick r:id="rId2"/>
               </a:rPr>
               <a:t>http://go/rwnnif8m</a:t>
             </a:r>
-            <a:endParaRPr lang="en-US" dirty="0" smtClean="0"/>
-          </a:p>
-          <a:p>
             <a:endParaRPr lang="en-US" dirty="0"/>
           </a:p>
           <a:p>
-            <a:r>
-              <a:rPr lang="en-US" dirty="0" smtClean="0"/>
+            <a:endParaRPr lang="en-US" dirty="0"/>
+          </a:p>
+          <a:p>
+            <a:r>
+              <a:rPr lang="en-US" dirty="0"/>
               <a:t>Open </a:t>
             </a:r>
             <a:r>
-              <a:rPr lang="en-US" dirty="0" err="1" smtClean="0"/>
+              <a:rPr lang="en-US" dirty="0" err="1"/>
               <a:t>tripdeviser.html</a:t>
             </a:r>
             <a:r>
-              <a:rPr lang="en-US" dirty="0" smtClean="0"/>
+              <a:rPr lang="en-US" dirty="0"/>
               <a:t> in your browser</a:t>
             </a:r>
           </a:p>
@@ -4260,10 +4211,9 @@
           <a:p>
             <a:pPr algn="ctr"/>
             <a:r>
-              <a:rPr lang="en-US" dirty="0" smtClean="0"/>
+              <a:rPr lang="en-US" dirty="0"/>
               <a:t>Today’s Exercise</a:t>
             </a:r>
-            <a:endParaRPr lang="en-US" dirty="0"/>
           </a:p>
         </p:txBody>
       </p:sp>
@@ -4283,51 +4233,51 @@
           <a:lstStyle/>
           <a:p>
             <a:r>
-              <a:rPr lang="en-US" dirty="0" smtClean="0"/>
+              <a:rPr lang="en-US" dirty="0"/>
               <a:t>Modify </a:t>
             </a:r>
             <a:r>
-              <a:rPr lang="en-US" dirty="0" err="1" smtClean="0"/>
+              <a:rPr lang="en-US" dirty="0" err="1"/>
               <a:t>restaurant_webserver.py</a:t>
             </a:r>
             <a:r>
-              <a:rPr lang="en-US" dirty="0" smtClean="0"/>
+              <a:rPr lang="en-US" dirty="0"/>
               <a:t> so that we can visit:</a:t>
             </a:r>
           </a:p>
           <a:p>
             <a:pPr lvl="1"/>
             <a:r>
-              <a:rPr lang="en-US" dirty="0" smtClean="0">
+              <a:rPr lang="en-US" dirty="0">
                 <a:hlinkClick r:id="rId2"/>
               </a:rPr>
               <a:t>http://127.0.0.1:8080/tripdeviser/pret</a:t>
             </a:r>
             <a:r>
-              <a:rPr lang="en-US" dirty="0" smtClean="0"/>
+              <a:rPr lang="en-US" dirty="0"/>
               <a:t> (for example)</a:t>
             </a:r>
           </a:p>
           <a:p>
             <a:pPr lvl="1"/>
             <a:r>
-              <a:rPr lang="en-US" dirty="0" smtClean="0"/>
+              <a:rPr lang="en-US" dirty="0"/>
               <a:t>It should display the HTML from </a:t>
             </a:r>
             <a:r>
-              <a:rPr lang="en-US" dirty="0" err="1" smtClean="0"/>
+              <a:rPr lang="en-US" dirty="0" err="1"/>
               <a:t>tripdeviser.html</a:t>
             </a:r>
             <a:r>
-              <a:rPr lang="en-US" dirty="0" smtClean="0"/>
+              <a:rPr lang="en-US" dirty="0"/>
               <a:t> with the details of </a:t>
             </a:r>
             <a:r>
-              <a:rPr lang="en-US" dirty="0" err="1" smtClean="0"/>
+              <a:rPr lang="en-US" dirty="0" err="1"/>
               <a:t>pret</a:t>
             </a:r>
             <a:r>
-              <a:rPr lang="en-US" dirty="0" smtClean="0"/>
+              <a:rPr lang="en-US" dirty="0"/>
               <a:t> filled in.</a:t>
             </a:r>
           </a:p>
@@ -4356,23 +4306,18 @@
           <a:p>
             <a:r>
               <a:rPr lang="en-US" dirty="0"/>
-              <a:t>There’s a super-secret hidden third part of this </a:t>
-            </a:r>
-            <a:r>
-              <a:rPr lang="en-US" dirty="0" smtClean="0"/>
-              <a:t>exercise. </a:t>
+              <a:t>There’s a super-secret hidden third part of this exercise. </a:t>
             </a:r>
             <a:br>
-              <a:rPr lang="en-US" dirty="0" smtClean="0"/>
+              <a:rPr lang="en-US" dirty="0"/>
             </a:br>
             <a:r>
-              <a:rPr lang="en-US" dirty="0" smtClean="0"/>
+              <a:rPr lang="en-US" dirty="0"/>
               <a:t>	Can you find it and complete it too?</a:t>
             </a:r>
+          </a:p>
+          <a:p>
             <a:endParaRPr lang="en-US" dirty="0"/>
-          </a:p>
-          <a:p>
-            <a:endParaRPr lang="en-US" dirty="0" smtClean="0"/>
           </a:p>
         </p:txBody>
       </p:sp>
@@ -4416,13 +4361,6 @@
   <p:clrMapOvr>
     <a:masterClrMapping/>
   </p:clrMapOvr>
-  <p:timing>
-    <p:tnLst>
-      <p:par>
-        <p:cTn id="1" dur="indefinite" restart="never" nodeType="tmRoot"/>
-      </p:par>
-    </p:tnLst>
-  </p:timing>
 </p:sld>
 </file>
 
@@ -4461,15 +4399,169 @@
           <a:lstStyle/>
           <a:p>
             <a:r>
-              <a:rPr lang="en-US" dirty="0" smtClean="0">
+              <a:rPr lang="en-US" dirty="0">
                 <a:latin typeface="Consolas" charset="0"/>
                 <a:ea typeface="Consolas" charset="0"/>
                 <a:cs typeface="Consolas" charset="0"/>
               </a:rPr>
-              <a:t>open</a:t>
-            </a:r>
-            <a:r>
-              <a:rPr lang="en-US" dirty="0" smtClean="0">
+              <a:t>open(</a:t>
+            </a:r>
+            <a:r>
+              <a:rPr lang="en-US" dirty="0"/>
+              <a:t>'</a:t>
+            </a:r>
+            <a:r>
+              <a:rPr lang="en-US" dirty="0">
+                <a:latin typeface="Consolas" charset="0"/>
+                <a:ea typeface="Consolas" charset="0"/>
+                <a:cs typeface="Consolas" charset="0"/>
+              </a:rPr>
+              <a:t>filename</a:t>
+            </a:r>
+            <a:r>
+              <a:rPr lang="en-US" dirty="0"/>
+              <a:t>'</a:t>
+            </a:r>
+            <a:r>
+              <a:rPr lang="en-US" dirty="0">
+                <a:latin typeface="Consolas" charset="0"/>
+                <a:ea typeface="Consolas" charset="0"/>
+                <a:cs typeface="Consolas" charset="0"/>
+              </a:rPr>
+              <a:t>)</a:t>
+            </a:r>
+            <a:r>
+              <a:rPr lang="en-US" dirty="0"/>
+              <a:t> </a:t>
+            </a:r>
+            <a:br>
+              <a:rPr lang="en-US" dirty="0"/>
+            </a:br>
+            <a:br>
+              <a:rPr lang="en-US" dirty="0"/>
+            </a:br>
+            <a:r>
+              <a:rPr lang="en-US" dirty="0"/>
+              <a:t>	will be useful in reading from a file</a:t>
+            </a:r>
+          </a:p>
+          <a:p>
+            <a:endParaRPr lang="en-US" dirty="0"/>
+          </a:p>
+          <a:p>
+            <a:r>
+              <a:rPr lang="en-US" dirty="0" err="1">
+                <a:latin typeface="Consolas" charset="0"/>
+                <a:ea typeface="Consolas" charset="0"/>
+                <a:cs typeface="Consolas" charset="0"/>
+              </a:rPr>
+              <a:t>str</a:t>
+            </a:r>
+            <a:r>
+              <a:rPr lang="en-US" dirty="0">
+                <a:latin typeface="Consolas" charset="0"/>
+                <a:ea typeface="Consolas" charset="0"/>
+                <a:cs typeface="Consolas" charset="0"/>
+              </a:rPr>
+              <a:t>(restaurants[</a:t>
+            </a:r>
+            <a:r>
+              <a:rPr lang="en-US" dirty="0"/>
+              <a:t>'</a:t>
+            </a:r>
+            <a:r>
+              <a:rPr lang="en-US" dirty="0" err="1">
+                <a:latin typeface="Consolas" charset="0"/>
+                <a:ea typeface="Consolas" charset="0"/>
+                <a:cs typeface="Consolas" charset="0"/>
+              </a:rPr>
+              <a:t>pret</a:t>
+            </a:r>
+            <a:r>
+              <a:rPr lang="en-US" dirty="0"/>
+              <a:t>'</a:t>
+            </a:r>
+            <a:r>
+              <a:rPr lang="en-US" dirty="0">
+                <a:latin typeface="Consolas" charset="0"/>
+                <a:ea typeface="Consolas" charset="0"/>
+                <a:cs typeface="Consolas" charset="0"/>
+              </a:rPr>
+              <a:t>])</a:t>
+            </a:r>
+            <a:br>
+              <a:rPr lang="en-US" dirty="0">
+                <a:latin typeface="Consolas" charset="0"/>
+                <a:ea typeface="Consolas" charset="0"/>
+                <a:cs typeface="Consolas" charset="0"/>
+              </a:rPr>
+            </a:br>
+            <a:r>
+              <a:rPr lang="en-US" dirty="0">
+                <a:latin typeface="Consolas" charset="0"/>
+                <a:ea typeface="Consolas" charset="0"/>
+                <a:cs typeface="Consolas" charset="0"/>
+              </a:rPr>
+              <a:t>	</a:t>
+            </a:r>
+            <a:br>
+              <a:rPr lang="en-US" dirty="0">
+                <a:latin typeface="Consolas" charset="0"/>
+                <a:ea typeface="Consolas" charset="0"/>
+                <a:cs typeface="Consolas" charset="0"/>
+              </a:rPr>
+            </a:br>
+            <a:r>
+              <a:rPr lang="en-US" dirty="0">
+                <a:latin typeface="Consolas" charset="0"/>
+                <a:ea typeface="Consolas" charset="0"/>
+                <a:cs typeface="Consolas" charset="0"/>
+              </a:rPr>
+              <a:t>	</a:t>
+            </a:r>
+            <a:r>
+              <a:rPr lang="en-US" dirty="0"/>
+              <a:t>gives the details of </a:t>
+            </a:r>
+            <a:r>
+              <a:rPr lang="en-US" dirty="0" err="1"/>
+              <a:t>pret</a:t>
+            </a:r>
+            <a:r>
+              <a:rPr lang="en-US" dirty="0"/>
+              <a:t> in a useful form</a:t>
+            </a:r>
+          </a:p>
+          <a:p>
+            <a:endParaRPr lang="en-US" dirty="0"/>
+          </a:p>
+          <a:p>
+            <a:r>
+              <a:rPr lang="en-US" dirty="0" err="1">
+                <a:latin typeface="Consolas" charset="0"/>
+                <a:ea typeface="Consolas" charset="0"/>
+                <a:cs typeface="Consolas" charset="0"/>
+              </a:rPr>
+              <a:t>my_string</a:t>
+            </a:r>
+            <a:r>
+              <a:rPr lang="en-US" dirty="0">
+                <a:latin typeface="Consolas" charset="0"/>
+                <a:ea typeface="Consolas" charset="0"/>
+                <a:cs typeface="Consolas" charset="0"/>
+              </a:rPr>
+              <a:t> = </a:t>
+            </a:r>
+            <a:r>
+              <a:rPr lang="en-US" dirty="0" err="1">
+                <a:latin typeface="Consolas" charset="0"/>
+                <a:ea typeface="Consolas" charset="0"/>
+                <a:cs typeface="Consolas" charset="0"/>
+              </a:rPr>
+              <a:t>my_string.replace</a:t>
+            </a:r>
+            <a:r>
+              <a:rPr lang="en-US" dirty="0">
                 <a:latin typeface="Consolas" charset="0"/>
                 <a:ea typeface="Consolas" charset="0"/>
                 <a:cs typeface="Consolas" charset="0"/>
@@ -4477,173 +4569,57 @@
               <a:t>(</a:t>
             </a:r>
             <a:r>
-              <a:rPr lang="en-US" dirty="0" smtClean="0"/>
+              <a:rPr lang="en-US" dirty="0"/>
               <a:t>'</a:t>
             </a:r>
             <a:r>
-              <a:rPr lang="en-US" dirty="0" smtClean="0">
+              <a:rPr lang="en-US" dirty="0">
                 <a:latin typeface="Consolas" charset="0"/>
                 <a:ea typeface="Consolas" charset="0"/>
                 <a:cs typeface="Consolas" charset="0"/>
               </a:rPr>
-              <a:t>filename</a:t>
+              <a:t>AAA</a:t>
             </a:r>
             <a:r>
               <a:rPr lang="en-US" dirty="0"/>
               <a:t>'</a:t>
             </a:r>
             <a:r>
-              <a:rPr lang="en-US" dirty="0" smtClean="0">
+              <a:rPr lang="en-US" dirty="0">
                 <a:latin typeface="Consolas" charset="0"/>
                 <a:ea typeface="Consolas" charset="0"/>
                 <a:cs typeface="Consolas" charset="0"/>
               </a:rPr>
-              <a:t>)</a:t>
-            </a:r>
-            <a:r>
-              <a:rPr lang="en-US" dirty="0" smtClean="0"/>
-              <a:t> </a:t>
+              <a:t>,</a:t>
             </a:r>
             <a:r>
               <a:rPr lang="en-US" dirty="0"/>
-              <a:t/>
-            </a:r>
-            <a:br>
-              <a:rPr lang="en-US" dirty="0"/>
-            </a:br>
-            <a:r>
-              <a:rPr lang="en-US" dirty="0" smtClean="0"/>
-              <a:t/>
-            </a:r>
-            <a:br>
-              <a:rPr lang="en-US" dirty="0" smtClean="0"/>
-            </a:br>
-            <a:r>
-              <a:rPr lang="en-US" dirty="0"/>
-              <a:t>	</a:t>
-            </a:r>
-            <a:r>
-              <a:rPr lang="en-US" dirty="0" smtClean="0"/>
-              <a:t>will </a:t>
-            </a:r>
-            <a:r>
-              <a:rPr lang="en-US" dirty="0"/>
-              <a:t>be useful in reading from a </a:t>
-            </a:r>
-            <a:r>
-              <a:rPr lang="en-US" dirty="0" smtClean="0"/>
-              <a:t>file</a:t>
-            </a:r>
-          </a:p>
-          <a:p>
-            <a:endParaRPr lang="en-US" dirty="0"/>
-          </a:p>
-          <a:p>
-            <a:r>
-              <a:rPr lang="en-US" dirty="0" err="1" smtClean="0">
+              <a:t> '</a:t>
+            </a:r>
+            <a:r>
+              <a:rPr lang="en-US" dirty="0">
                 <a:latin typeface="Consolas" charset="0"/>
                 <a:ea typeface="Consolas" charset="0"/>
                 <a:cs typeface="Consolas" charset="0"/>
               </a:rPr>
-              <a:t>str</a:t>
-            </a:r>
-            <a:r>
-              <a:rPr lang="en-US" dirty="0" smtClean="0">
-                <a:latin typeface="Consolas" charset="0"/>
-                <a:ea typeface="Consolas" charset="0"/>
-                <a:cs typeface="Consolas" charset="0"/>
-              </a:rPr>
-              <a:t>(restaurants</a:t>
-            </a:r>
-            <a:r>
-              <a:rPr lang="en-US" dirty="0" smtClean="0">
-                <a:latin typeface="Consolas" charset="0"/>
-                <a:ea typeface="Consolas" charset="0"/>
-                <a:cs typeface="Consolas" charset="0"/>
-              </a:rPr>
-              <a:t>[</a:t>
-            </a:r>
-            <a:r>
-              <a:rPr lang="en-US" dirty="0" smtClean="0"/>
-              <a:t>'</a:t>
-            </a:r>
-            <a:r>
-              <a:rPr lang="en-US" dirty="0" err="1" smtClean="0">
-                <a:latin typeface="Consolas" charset="0"/>
-                <a:ea typeface="Consolas" charset="0"/>
-                <a:cs typeface="Consolas" charset="0"/>
-              </a:rPr>
-              <a:t>pret</a:t>
+              <a:t>BBB</a:t>
             </a:r>
             <a:r>
               <a:rPr lang="en-US" dirty="0"/>
-              <a:t>'</a:t>
-            </a:r>
-            <a:r>
-              <a:rPr lang="en-US" dirty="0" smtClean="0">
-                <a:latin typeface="Consolas" charset="0"/>
-                <a:ea typeface="Consolas" charset="0"/>
-                <a:cs typeface="Consolas" charset="0"/>
-              </a:rPr>
-              <a:t>])</a:t>
-            </a:r>
-            <a:r>
-              <a:rPr lang="en-US" dirty="0" smtClean="0">
-                <a:latin typeface="Consolas" charset="0"/>
-                <a:ea typeface="Consolas" charset="0"/>
-                <a:cs typeface="Consolas" charset="0"/>
-              </a:rPr>
-              <a:t/>
+              <a:t>') </a:t>
             </a:r>
             <a:br>
-              <a:rPr lang="en-US" dirty="0" smtClean="0">
-                <a:latin typeface="Consolas" charset="0"/>
-                <a:ea typeface="Consolas" charset="0"/>
-                <a:cs typeface="Consolas" charset="0"/>
-              </a:rPr>
+              <a:rPr lang="en-US" dirty="0"/>
             </a:br>
-            <a:r>
-              <a:rPr lang="en-US" dirty="0" smtClean="0">
-                <a:latin typeface="Consolas" charset="0"/>
-                <a:ea typeface="Consolas" charset="0"/>
-                <a:cs typeface="Consolas" charset="0"/>
-              </a:rPr>
-              <a:t>	</a:t>
-            </a:r>
             <a:br>
-              <a:rPr lang="en-US" dirty="0" smtClean="0">
-                <a:latin typeface="Consolas" charset="0"/>
-                <a:ea typeface="Consolas" charset="0"/>
-                <a:cs typeface="Consolas" charset="0"/>
-              </a:rPr>
+              <a:rPr lang="en-US" dirty="0"/>
             </a:br>
             <a:r>
-              <a:rPr lang="en-US" dirty="0" smtClean="0">
-                <a:latin typeface="Consolas" charset="0"/>
-                <a:ea typeface="Consolas" charset="0"/>
-                <a:cs typeface="Consolas" charset="0"/>
-              </a:rPr>
-              <a:t>	</a:t>
-            </a:r>
-            <a:r>
-              <a:rPr lang="en-US" dirty="0" smtClean="0"/>
-              <a:t>gives the details of </a:t>
-            </a:r>
-            <a:r>
-              <a:rPr lang="en-US" dirty="0" err="1" smtClean="0"/>
-              <a:t>pret</a:t>
-            </a:r>
-            <a:r>
-              <a:rPr lang="en-US" dirty="0" smtClean="0"/>
-              <a:t> in a useful form</a:t>
-            </a:r>
-          </a:p>
-          <a:p>
-            <a:endParaRPr lang="en-US" dirty="0" smtClean="0"/>
-          </a:p>
-          <a:p>
-            <a:r>
-              <a:rPr lang="en-US" dirty="0" err="1" smtClean="0">
+              <a:rPr lang="en-US" dirty="0"/>
+              <a:t>	will replace all instances of ‘AAA’ in </a:t>
+            </a:r>
+            <a:r>
+              <a:rPr lang="en-US" dirty="0" err="1">
                 <a:latin typeface="Consolas" charset="0"/>
                 <a:ea typeface="Consolas" charset="0"/>
                 <a:cs typeface="Consolas" charset="0"/>
@@ -4651,108 +4627,6 @@
               <a:t>my_string</a:t>
             </a:r>
             <a:r>
-              <a:rPr lang="en-US" dirty="0" smtClean="0">
-                <a:latin typeface="Consolas" charset="0"/>
-                <a:ea typeface="Consolas" charset="0"/>
-                <a:cs typeface="Consolas" charset="0"/>
-              </a:rPr>
-              <a:t> = </a:t>
-            </a:r>
-            <a:r>
-              <a:rPr lang="en-US" dirty="0" err="1" smtClean="0">
-                <a:latin typeface="Consolas" charset="0"/>
-                <a:ea typeface="Consolas" charset="0"/>
-                <a:cs typeface="Consolas" charset="0"/>
-              </a:rPr>
-              <a:t>my_string.replace</a:t>
-            </a:r>
-            <a:r>
-              <a:rPr lang="en-US" dirty="0" smtClean="0">
-                <a:latin typeface="Consolas" charset="0"/>
-                <a:ea typeface="Consolas" charset="0"/>
-                <a:cs typeface="Consolas" charset="0"/>
-              </a:rPr>
-              <a:t>(</a:t>
-            </a:r>
-            <a:r>
-              <a:rPr lang="en-US" dirty="0" smtClean="0"/>
-              <a:t>'</a:t>
-            </a:r>
-            <a:r>
-              <a:rPr lang="en-US" dirty="0" smtClean="0">
-                <a:latin typeface="Consolas" charset="0"/>
-                <a:ea typeface="Consolas" charset="0"/>
-                <a:cs typeface="Consolas" charset="0"/>
-              </a:rPr>
-              <a:t>AAA</a:t>
-            </a:r>
-            <a:r>
-              <a:rPr lang="en-US" dirty="0" smtClean="0"/>
-              <a:t>'</a:t>
-            </a:r>
-            <a:r>
-              <a:rPr lang="en-US" dirty="0" smtClean="0">
-                <a:latin typeface="Consolas" charset="0"/>
-                <a:ea typeface="Consolas" charset="0"/>
-                <a:cs typeface="Consolas" charset="0"/>
-              </a:rPr>
-              <a:t>,</a:t>
-            </a:r>
-            <a:r>
-              <a:rPr lang="en-US" dirty="0"/>
-              <a:t> </a:t>
-            </a:r>
-            <a:r>
-              <a:rPr lang="en-US" dirty="0" smtClean="0"/>
-              <a:t>'</a:t>
-            </a:r>
-            <a:r>
-              <a:rPr lang="en-US" dirty="0" smtClean="0">
-                <a:latin typeface="Consolas" charset="0"/>
-                <a:ea typeface="Consolas" charset="0"/>
-                <a:cs typeface="Consolas" charset="0"/>
-              </a:rPr>
-              <a:t>BBB</a:t>
-            </a:r>
-            <a:r>
-              <a:rPr lang="en-US" dirty="0"/>
-              <a:t>') </a:t>
-            </a:r>
-            <a:r>
-              <a:rPr lang="en-US" dirty="0"/>
-              <a:t/>
-            </a:r>
-            <a:br>
-              <a:rPr lang="en-US" dirty="0"/>
-            </a:br>
-            <a:r>
-              <a:rPr lang="en-US" dirty="0" smtClean="0"/>
-              <a:t/>
-            </a:r>
-            <a:br>
-              <a:rPr lang="en-US" dirty="0" smtClean="0"/>
-            </a:br>
-            <a:r>
-              <a:rPr lang="en-US" dirty="0"/>
-              <a:t>	</a:t>
-            </a:r>
-            <a:r>
-              <a:rPr lang="en-US" dirty="0" smtClean="0"/>
-              <a:t>will </a:t>
-            </a:r>
-            <a:r>
-              <a:rPr lang="en-US" dirty="0"/>
-              <a:t>replace all instances of ‘AAA’ in </a:t>
-            </a:r>
-            <a:r>
-              <a:rPr lang="en-US" dirty="0" err="1" smtClean="0">
-                <a:latin typeface="Consolas" charset="0"/>
-                <a:ea typeface="Consolas" charset="0"/>
-                <a:cs typeface="Consolas" charset="0"/>
-              </a:rPr>
-              <a:t>my_string</a:t>
-            </a:r>
-            <a:r>
               <a:rPr lang="en-US" dirty="0">
                 <a:ea typeface="Consolas" charset="0"/>
                 <a:cs typeface="Consolas" charset="0"/>
@@ -4760,18 +4634,9 @@
               <a:t> </a:t>
             </a:r>
             <a:r>
-              <a:rPr lang="en-US" dirty="0" smtClean="0"/>
-              <a:t>with </a:t>
-            </a:r>
-            <a:r>
               <a:rPr lang="en-US" dirty="0"/>
-              <a:t>‘BBB</a:t>
-            </a:r>
-            <a:r>
-              <a:rPr lang="en-US" dirty="0" smtClean="0"/>
-              <a:t>’</a:t>
-            </a:r>
-            <a:endParaRPr lang="en-US" dirty="0"/>
+              <a:t>with ‘BBB’</a:t>
+            </a:r>
           </a:p>
         </p:txBody>
       </p:sp>
@@ -4792,7 +4657,7 @@
           <a:p>
             <a:pPr algn="ctr"/>
             <a:r>
-              <a:rPr lang="en-GB" dirty="0" smtClean="0"/>
+              <a:rPr lang="en-GB" dirty="0"/>
               <a:t>Hints</a:t>
             </a:r>
             <a:endParaRPr lang="en-US" dirty="0"/>
@@ -4839,13 +4704,6 @@
   <p:clrMapOvr>
     <a:masterClrMapping/>
   </p:clrMapOvr>
-  <p:timing>
-    <p:tnLst>
-      <p:par>
-        <p:cTn id="1" dur="indefinite" restart="never" nodeType="tmRoot"/>
-      </p:par>
-    </p:tnLst>
-  </p:timing>
 </p:sld>
 </file>
 
@@ -4905,7 +4763,7 @@
           <a:bodyPr/>
           <a:lstStyle/>
           <a:p>
-            <a:endParaRPr lang="en-US" dirty="0" smtClean="0"/>
+            <a:endParaRPr lang="en-US" dirty="0"/>
           </a:p>
           <a:p>
             <a:endParaRPr lang="en-US" dirty="0"/>
@@ -4955,13 +4813,6 @@
   <p:clrMapOvr>
     <a:masterClrMapping/>
   </p:clrMapOvr>
-  <p:timing>
-    <p:tnLst>
-      <p:par>
-        <p:cTn id="1" dur="indefinite" restart="never" nodeType="tmRoot"/>
-      </p:par>
-    </p:tnLst>
-  </p:timing>
 </p:sld>
 </file>
 
@@ -4999,16 +4850,21 @@
           <a:p>
             <a:pPr algn="ctr"/>
             <a:r>
-              <a:rPr lang="en-US" dirty="0" smtClean="0"/>
+              <a:rPr lang="en-US" dirty="0"/>
               <a:t>Where did we get to?</a:t>
             </a:r>
-            <a:endParaRPr lang="en-US" dirty="0"/>
           </a:p>
         </p:txBody>
       </p:sp>
       <p:pic>
         <p:nvPicPr>
-          <p:cNvPr id="6" name="Content Placeholder 5"/>
+          <p:cNvPr id="8" name="Content Placeholder 7">
+            <a:extLst>
+              <a:ext uri="{FF2B5EF4-FFF2-40B4-BE49-F238E27FC236}">
+                <a16:creationId xmlns:a16="http://schemas.microsoft.com/office/drawing/2014/main" id="{A66C652B-2C74-734A-BF10-C893734CFB47}"/>
+              </a:ext>
+            </a:extLst>
+          </p:cNvPr>
           <p:cNvPicPr>
             <a:picLocks noGrp="1" noChangeAspect="1"/>
           </p:cNvPicPr>
@@ -5017,21 +4873,15 @@
           </p:nvPr>
         </p:nvPicPr>
         <p:blipFill>
-          <a:blip r:embed="rId3">
-            <a:extLst>
-              <a:ext uri="{28A0092B-C50C-407E-A947-70E740481C1C}">
-                <a14:useLocalDpi xmlns:a14="http://schemas.microsoft.com/office/drawing/2010/main" val="0"/>
-              </a:ext>
-            </a:extLst>
-          </a:blip>
+          <a:blip r:embed="rId3"/>
           <a:stretch>
             <a:fillRect/>
           </a:stretch>
         </p:blipFill>
         <p:spPr>
           <a:xfrm>
-            <a:off x="1377950" y="2039144"/>
-            <a:ext cx="9436100" cy="3924300"/>
+            <a:off x="1758950" y="2185194"/>
+            <a:ext cx="8674100" cy="3632200"/>
           </a:xfrm>
         </p:spPr>
       </p:pic>
@@ -5075,13 +4925,6 @@
   <p:clrMapOvr>
     <a:masterClrMapping/>
   </p:clrMapOvr>
-  <p:timing>
-    <p:tnLst>
-      <p:par>
-        <p:cTn id="1" dur="indefinite" restart="never" nodeType="tmRoot"/>
-      </p:par>
-    </p:tnLst>
-  </p:timing>
 </p:sld>
 </file>
 
@@ -5119,10 +4962,9 @@
           <a:p>
             <a:pPr algn="ctr"/>
             <a:r>
-              <a:rPr lang="en-US" dirty="0" smtClean="0"/>
+              <a:rPr lang="en-US" dirty="0"/>
               <a:t>The Roads less travelled</a:t>
             </a:r>
-            <a:endParaRPr lang="en-US" dirty="0"/>
           </a:p>
         </p:txBody>
       </p:sp>
@@ -5144,42 +4986,42 @@
           <a:lstStyle/>
           <a:p>
             <a:r>
-              <a:rPr lang="en-US" dirty="0" smtClean="0"/>
+              <a:rPr lang="en-US" dirty="0"/>
               <a:t>What we haven’t covered:</a:t>
             </a:r>
           </a:p>
           <a:p>
             <a:pPr lvl="1"/>
             <a:r>
-              <a:rPr lang="en-US" dirty="0" smtClean="0"/>
+              <a:rPr lang="en-US" dirty="0"/>
               <a:t>XML</a:t>
             </a:r>
           </a:p>
           <a:p>
             <a:pPr lvl="1"/>
             <a:r>
-              <a:rPr lang="en-US" dirty="0" smtClean="0"/>
+              <a:rPr lang="en-US" dirty="0"/>
               <a:t>SQL and NoSQL Databases</a:t>
             </a:r>
           </a:p>
           <a:p>
             <a:pPr lvl="1"/>
             <a:r>
-              <a:rPr lang="en-US" dirty="0" smtClean="0"/>
+              <a:rPr lang="en-US" dirty="0"/>
               <a:t>Raw TCP sockets</a:t>
             </a:r>
           </a:p>
           <a:p>
             <a:pPr lvl="1"/>
             <a:r>
-              <a:rPr lang="en-US" dirty="0" smtClean="0"/>
+              <a:rPr lang="en-US" dirty="0"/>
               <a:t>Other things</a:t>
             </a:r>
             <a:r>
-              <a:rPr lang="is-IS" dirty="0" smtClean="0"/>
+              <a:rPr lang="is-IS" dirty="0"/>
               <a:t>… ?</a:t>
             </a:r>
-            <a:endParaRPr lang="en-US" dirty="0" smtClean="0"/>
+            <a:endParaRPr lang="en-US" dirty="0"/>
           </a:p>
           <a:p>
             <a:pPr lvl="1"/>
@@ -5187,7 +5029,7 @@
           </a:p>
           <a:p>
             <a:r>
-              <a:rPr lang="en-US" dirty="0" smtClean="0"/>
+              <a:rPr lang="en-US" dirty="0"/>
               <a:t>What might our code look like if we were to use these storage methods / technologies?</a:t>
             </a:r>
           </a:p>
@@ -5236,13 +5078,6 @@
   <p:clrMapOvr>
     <a:masterClrMapping/>
   </p:clrMapOvr>
-  <p:timing>
-    <p:tnLst>
-      <p:par>
-        <p:cTn id="1" dur="indefinite" restart="never" nodeType="tmRoot"/>
-      </p:par>
-    </p:tnLst>
-  </p:timing>
 </p:sld>
 </file>
 
@@ -5280,10 +5115,9 @@
           <a:p>
             <a:pPr algn="ctr"/>
             <a:r>
-              <a:rPr lang="en-US" dirty="0" smtClean="0"/>
+              <a:rPr lang="en-US" dirty="0"/>
               <a:t>XML</a:t>
             </a:r>
-            <a:endParaRPr lang="en-US" dirty="0"/>
           </a:p>
         </p:txBody>
       </p:sp>
@@ -5356,13 +5190,6 @@
   <p:clrMapOvr>
     <a:masterClrMapping/>
   </p:clrMapOvr>
-  <p:timing>
-    <p:tnLst>
-      <p:par>
-        <p:cTn id="1" dur="indefinite" restart="never" nodeType="tmRoot"/>
-      </p:par>
-    </p:tnLst>
-  </p:timing>
 </p:sld>
 </file>
 
@@ -5400,10 +5227,9 @@
           <a:p>
             <a:pPr algn="ctr"/>
             <a:r>
-              <a:rPr lang="en-US" dirty="0" smtClean="0"/>
+              <a:rPr lang="en-US" dirty="0"/>
               <a:t>XML - Continued</a:t>
             </a:r>
-            <a:endParaRPr lang="en-US" dirty="0"/>
           </a:p>
         </p:txBody>
       </p:sp>
@@ -5489,11 +5315,11 @@
           <a:lstStyle/>
           <a:p>
             <a:r>
-              <a:rPr lang="en-US" dirty="0" smtClean="0"/>
+              <a:rPr lang="en-US" dirty="0"/>
               <a:t>Different XML Schemas require very different code to </a:t>
             </a:r>
             <a:r>
-              <a:rPr lang="en-US" smtClean="0"/>
+              <a:rPr lang="en-US"/>
               <a:t>understand them</a:t>
             </a:r>
             <a:endParaRPr lang="en-US" dirty="0"/>
@@ -5510,13 +5336,6 @@
   <p:clrMapOvr>
     <a:masterClrMapping/>
   </p:clrMapOvr>
-  <p:timing>
-    <p:tnLst>
-      <p:par>
-        <p:cTn id="1" dur="indefinite" restart="never" nodeType="tmRoot"/>
-      </p:par>
-    </p:tnLst>
-  </p:timing>
 </p:sld>
 </file>
 
@@ -5554,10 +5373,9 @@
           <a:p>
             <a:pPr algn="ctr"/>
             <a:r>
-              <a:rPr lang="en-US" dirty="0" smtClean="0"/>
+              <a:rPr lang="en-US" dirty="0"/>
               <a:t>SQL</a:t>
             </a:r>
-            <a:endParaRPr lang="en-US" dirty="0"/>
           </a:p>
         </p:txBody>
       </p:sp>
@@ -5577,35 +5395,35 @@
           <a:lstStyle/>
           <a:p>
             <a:r>
-              <a:rPr lang="en-US" dirty="0" smtClean="0"/>
+              <a:rPr lang="en-US" dirty="0"/>
               <a:t>Which implementation?</a:t>
             </a:r>
           </a:p>
           <a:p>
             <a:pPr lvl="1"/>
             <a:r>
-              <a:rPr lang="en-US" dirty="0" smtClean="0"/>
+              <a:rPr lang="en-US" dirty="0"/>
               <a:t>MS – SQL</a:t>
             </a:r>
           </a:p>
           <a:p>
             <a:pPr lvl="1"/>
             <a:r>
-              <a:rPr lang="en-US" dirty="0" smtClean="0"/>
-              <a:t>MySQL / Maria DB</a:t>
+              <a:rPr lang="en-US" dirty="0"/>
+              <a:t>MySQL / Maria DB / Aurora</a:t>
             </a:r>
           </a:p>
           <a:p>
             <a:pPr lvl="1"/>
             <a:r>
-              <a:rPr lang="en-US" dirty="0" smtClean="0"/>
+              <a:rPr lang="en-US" dirty="0"/>
               <a:t>SQLite</a:t>
             </a:r>
           </a:p>
           <a:p>
             <a:pPr lvl="1"/>
             <a:r>
-              <a:rPr lang="is-IS" dirty="0" smtClean="0"/>
+              <a:rPr lang="is-IS" dirty="0"/>
               <a:t>Oracle, etc…</a:t>
             </a:r>
             <a:endParaRPr lang="en-US" dirty="0"/>
@@ -5652,13 +5470,6 @@
   <p:clrMapOvr>
     <a:masterClrMapping/>
   </p:clrMapOvr>
-  <p:timing>
-    <p:tnLst>
-      <p:par>
-        <p:cTn id="1" dur="indefinite" restart="never" nodeType="tmRoot"/>
-      </p:par>
-    </p:tnLst>
-  </p:timing>
 </p:sld>
 </file>
 
@@ -5696,10 +5507,9 @@
           <a:p>
             <a:pPr algn="ctr"/>
             <a:r>
-              <a:rPr lang="en-US" dirty="0" smtClean="0"/>
+              <a:rPr lang="en-US" dirty="0"/>
               <a:t>SQL</a:t>
             </a:r>
-            <a:endParaRPr lang="en-US" dirty="0"/>
           </a:p>
         </p:txBody>
       </p:sp>
@@ -5721,35 +5531,35 @@
           <a:lstStyle/>
           <a:p>
             <a:r>
-              <a:rPr lang="en-US" dirty="0" smtClean="0"/>
+              <a:rPr lang="en-US" dirty="0"/>
               <a:t>Which implementation?</a:t>
             </a:r>
           </a:p>
           <a:p>
             <a:pPr lvl="1"/>
             <a:r>
-              <a:rPr lang="en-US" dirty="0" smtClean="0"/>
+              <a:rPr lang="en-US" dirty="0"/>
               <a:t>MS – SQL</a:t>
             </a:r>
           </a:p>
           <a:p>
             <a:pPr lvl="1"/>
             <a:r>
-              <a:rPr lang="en-US" dirty="0" smtClean="0"/>
+              <a:rPr lang="en-US" dirty="0"/>
               <a:t>MySQL / Maria DB</a:t>
             </a:r>
           </a:p>
           <a:p>
             <a:pPr lvl="1"/>
             <a:r>
-              <a:rPr lang="en-US" dirty="0" smtClean="0"/>
+              <a:rPr lang="en-US" dirty="0"/>
               <a:t>SQLite</a:t>
             </a:r>
           </a:p>
           <a:p>
             <a:pPr lvl="1"/>
             <a:r>
-              <a:rPr lang="is-IS" dirty="0" smtClean="0"/>
+              <a:rPr lang="is-IS" dirty="0"/>
               <a:t>Oracle, etc…</a:t>
             </a:r>
           </a:p>
@@ -5759,14 +5569,13 @@
           </a:p>
           <a:p>
             <a:r>
-              <a:rPr lang="is-IS" dirty="0" smtClean="0"/>
+              <a:rPr lang="is-IS" dirty="0"/>
               <a:t>Python doesn’t have a single DB interface, unlike Perl (DBI), Java (JDBC), etc</a:t>
             </a:r>
-            <a:endParaRPr lang="is-IS" dirty="0"/>
-          </a:p>
-          <a:p>
-            <a:r>
-              <a:rPr lang="is-IS" dirty="0" smtClean="0"/>
+          </a:p>
+          <a:p>
+            <a:r>
+              <a:rPr lang="is-IS" dirty="0"/>
               <a:t>DB-API is a standard for DB connectivity modules.</a:t>
             </a:r>
           </a:p>
@@ -5818,13 +5627,6 @@
   <p:clrMapOvr>
     <a:masterClrMapping/>
   </p:clrMapOvr>
-  <p:timing>
-    <p:tnLst>
-      <p:par>
-        <p:cTn id="1" dur="indefinite" restart="never" nodeType="tmRoot"/>
-      </p:par>
-    </p:tnLst>
-  </p:timing>
 </p:sld>
 </file>
 
@@ -5862,14 +5664,13 @@
           <a:p>
             <a:pPr algn="ctr"/>
             <a:r>
-              <a:rPr lang="en-US" dirty="0" err="1" smtClean="0"/>
+              <a:rPr lang="en-US" dirty="0" err="1"/>
               <a:t>FreeTDS</a:t>
             </a:r>
             <a:r>
-              <a:rPr lang="en-US" dirty="0" smtClean="0"/>
+              <a:rPr lang="en-US" dirty="0"/>
               <a:t> (MS SQL Server) Example</a:t>
             </a:r>
-            <a:endParaRPr lang="en-US" dirty="0"/>
           </a:p>
         </p:txBody>
       </p:sp>
@@ -5942,13 +5743,6 @@
   <p:clrMapOvr>
     <a:masterClrMapping/>
   </p:clrMapOvr>
-  <p:timing>
-    <p:tnLst>
-      <p:par>
-        <p:cTn id="1" dur="indefinite" restart="never" nodeType="tmRoot"/>
-      </p:par>
-    </p:tnLst>
-  </p:timing>
 </p:sld>
 </file>
 
@@ -5986,10 +5780,9 @@
           <a:p>
             <a:pPr algn="ctr"/>
             <a:r>
-              <a:rPr lang="en-US" dirty="0" smtClean="0"/>
+              <a:rPr lang="en-US" dirty="0"/>
               <a:t>NoSQL (MongoDB)</a:t>
             </a:r>
-            <a:endParaRPr lang="en-US" dirty="0"/>
           </a:p>
         </p:txBody>
       </p:sp>
@@ -6062,13 +5855,6 @@
   <p:clrMapOvr>
     <a:masterClrMapping/>
   </p:clrMapOvr>
-  <p:timing>
-    <p:tnLst>
-      <p:par>
-        <p:cTn id="1" dur="indefinite" restart="never" nodeType="tmRoot"/>
-      </p:par>
-    </p:tnLst>
-  </p:timing>
 </p:sld>
 </file>
 

</xml_diff>

<commit_message>
Roads? Where we're going, we don't need roads...
</commit_message>
<xml_diff>
--- a/Python Level 2/Lesson 8/Session 8.pptx
+++ b/Python Level 2/Lesson 8/Session 8.pptx
@@ -5,7 +5,7 @@
     <p:sldMasterId id="2147483648" r:id="rId1"/>
   </p:sldMasterIdLst>
   <p:notesMasterIdLst>
-    <p:notesMasterId r:id="rId16"/>
+    <p:notesMasterId r:id="rId17"/>
   </p:notesMasterIdLst>
   <p:sldIdLst>
     <p:sldId id="257" r:id="rId2"/>
@@ -18,10 +18,11 @@
     <p:sldId id="265" r:id="rId9"/>
     <p:sldId id="266" r:id="rId10"/>
     <p:sldId id="267" r:id="rId11"/>
-    <p:sldId id="268" r:id="rId12"/>
-    <p:sldId id="269" r:id="rId13"/>
-    <p:sldId id="271" r:id="rId14"/>
-    <p:sldId id="270" r:id="rId15"/>
+    <p:sldId id="272" r:id="rId12"/>
+    <p:sldId id="268" r:id="rId13"/>
+    <p:sldId id="269" r:id="rId14"/>
+    <p:sldId id="271" r:id="rId15"/>
+    <p:sldId id="270" r:id="rId16"/>
   </p:sldIdLst>
   <p:sldSz cx="12192000" cy="6858000"/>
   <p:notesSz cx="6858000" cy="9144000"/>
@@ -210,7 +211,7 @@
           <a:p>
             <a:fld id="{77C30FF8-0303-4F4D-81BC-5EB2E73F8664}" type="datetimeFigureOut">
               <a:rPr lang="en-US" smtClean="0"/>
-              <a:t>3/17/19</a:t>
+              <a:t>3/18/19</a:t>
             </a:fld>
             <a:endParaRPr lang="en-US"/>
           </a:p>
@@ -1061,7 +1062,7 @@
           <a:p>
             <a:fld id="{86984813-33F6-9F40-A25F-D5C0CA50E5AD}" type="datetimeFigureOut">
               <a:rPr lang="en-US" smtClean="0"/>
-              <a:t>3/17/19</a:t>
+              <a:t>3/18/19</a:t>
             </a:fld>
             <a:endParaRPr lang="en-US"/>
           </a:p>
@@ -1229,7 +1230,7 @@
           <a:p>
             <a:fld id="{86984813-33F6-9F40-A25F-D5C0CA50E5AD}" type="datetimeFigureOut">
               <a:rPr lang="en-US" smtClean="0"/>
-              <a:t>3/17/19</a:t>
+              <a:t>3/18/19</a:t>
             </a:fld>
             <a:endParaRPr lang="en-US"/>
           </a:p>
@@ -1407,7 +1408,7 @@
           <a:p>
             <a:fld id="{86984813-33F6-9F40-A25F-D5C0CA50E5AD}" type="datetimeFigureOut">
               <a:rPr lang="en-US" smtClean="0"/>
-              <a:t>3/17/19</a:t>
+              <a:t>3/18/19</a:t>
             </a:fld>
             <a:endParaRPr lang="en-US"/>
           </a:p>
@@ -1575,7 +1576,7 @@
           <a:p>
             <a:fld id="{86984813-33F6-9F40-A25F-D5C0CA50E5AD}" type="datetimeFigureOut">
               <a:rPr lang="en-US" smtClean="0"/>
-              <a:t>3/17/19</a:t>
+              <a:t>3/18/19</a:t>
             </a:fld>
             <a:endParaRPr lang="en-US"/>
           </a:p>
@@ -1820,7 +1821,7 @@
           <a:p>
             <a:fld id="{86984813-33F6-9F40-A25F-D5C0CA50E5AD}" type="datetimeFigureOut">
               <a:rPr lang="en-US" smtClean="0"/>
-              <a:t>3/17/19</a:t>
+              <a:t>3/18/19</a:t>
             </a:fld>
             <a:endParaRPr lang="en-US"/>
           </a:p>
@@ -2049,7 +2050,7 @@
           <a:p>
             <a:fld id="{86984813-33F6-9F40-A25F-D5C0CA50E5AD}" type="datetimeFigureOut">
               <a:rPr lang="en-US" smtClean="0"/>
-              <a:t>3/17/19</a:t>
+              <a:t>3/18/19</a:t>
             </a:fld>
             <a:endParaRPr lang="en-US"/>
           </a:p>
@@ -2413,7 +2414,7 @@
           <a:p>
             <a:fld id="{86984813-33F6-9F40-A25F-D5C0CA50E5AD}" type="datetimeFigureOut">
               <a:rPr lang="en-US" smtClean="0"/>
-              <a:t>3/17/19</a:t>
+              <a:t>3/18/19</a:t>
             </a:fld>
             <a:endParaRPr lang="en-US"/>
           </a:p>
@@ -2530,7 +2531,7 @@
           <a:p>
             <a:fld id="{86984813-33F6-9F40-A25F-D5C0CA50E5AD}" type="datetimeFigureOut">
               <a:rPr lang="en-US" smtClean="0"/>
-              <a:t>3/17/19</a:t>
+              <a:t>3/18/19</a:t>
             </a:fld>
             <a:endParaRPr lang="en-US"/>
           </a:p>
@@ -2625,7 +2626,7 @@
           <a:p>
             <a:fld id="{86984813-33F6-9F40-A25F-D5C0CA50E5AD}" type="datetimeFigureOut">
               <a:rPr lang="en-US" smtClean="0"/>
-              <a:t>3/17/19</a:t>
+              <a:t>3/18/19</a:t>
             </a:fld>
             <a:endParaRPr lang="en-US"/>
           </a:p>
@@ -2900,7 +2901,7 @@
           <a:p>
             <a:fld id="{86984813-33F6-9F40-A25F-D5C0CA50E5AD}" type="datetimeFigureOut">
               <a:rPr lang="en-US" smtClean="0"/>
-              <a:t>3/17/19</a:t>
+              <a:t>3/18/19</a:t>
             </a:fld>
             <a:endParaRPr lang="en-US"/>
           </a:p>
@@ -3152,7 +3153,7 @@
           <a:p>
             <a:fld id="{86984813-33F6-9F40-A25F-D5C0CA50E5AD}" type="datetimeFigureOut">
               <a:rPr lang="en-US" smtClean="0"/>
-              <a:t>3/17/19</a:t>
+              <a:t>3/18/19</a:t>
             </a:fld>
             <a:endParaRPr lang="en-US"/>
           </a:p>
@@ -3363,7 +3364,7 @@
           <a:p>
             <a:fld id="{86984813-33F6-9F40-A25F-D5C0CA50E5AD}" type="datetimeFigureOut">
               <a:rPr lang="en-US" smtClean="0"/>
-              <a:t>3/17/19</a:t>
+              <a:t>3/18/19</a:t>
             </a:fld>
             <a:endParaRPr lang="en-US"/>
           </a:p>
@@ -4058,6 +4059,232 @@
       </p:grpSpPr>
       <p:sp>
         <p:nvSpPr>
+          <p:cNvPr id="2" name="Title 1">
+            <a:extLst>
+              <a:ext uri="{FF2B5EF4-FFF2-40B4-BE49-F238E27FC236}">
+                <a16:creationId xmlns:a16="http://schemas.microsoft.com/office/drawing/2014/main" id="{6D1310A9-2EA1-864C-A6ED-96BFF4C88EDD}"/>
+              </a:ext>
+            </a:extLst>
+          </p:cNvPr>
+          <p:cNvSpPr>
+            <a:spLocks noGrp="1"/>
+          </p:cNvSpPr>
+          <p:nvPr>
+            <p:ph type="title"/>
+          </p:nvPr>
+        </p:nvSpPr>
+        <p:spPr/>
+        <p:txBody>
+          <a:bodyPr/>
+          <a:lstStyle/>
+          <a:p>
+            <a:pPr algn="ctr"/>
+            <a:r>
+              <a:rPr lang="en-US" dirty="0"/>
+              <a:t>Where we’re going we don’t need roads!</a:t>
+            </a:r>
+          </a:p>
+        </p:txBody>
+      </p:sp>
+      <p:pic>
+        <p:nvPicPr>
+          <p:cNvPr id="8" name="Picture 7">
+            <a:extLst>
+              <a:ext uri="{FF2B5EF4-FFF2-40B4-BE49-F238E27FC236}">
+                <a16:creationId xmlns:a16="http://schemas.microsoft.com/office/drawing/2014/main" id="{29D25DD2-B1D2-BA4E-9BF5-97703A3B16EC}"/>
+              </a:ext>
+            </a:extLst>
+          </p:cNvPr>
+          <p:cNvPicPr>
+            <a:picLocks noChangeAspect="1"/>
+          </p:cNvPicPr>
+          <p:nvPr/>
+        </p:nvPicPr>
+        <p:blipFill>
+          <a:blip r:embed="rId2"/>
+          <a:stretch>
+            <a:fillRect/>
+          </a:stretch>
+        </p:blipFill>
+        <p:spPr>
+          <a:xfrm>
+            <a:off x="342900" y="2338016"/>
+            <a:ext cx="11506200" cy="1206500"/>
+          </a:xfrm>
+          <a:prstGeom prst="rect">
+            <a:avLst/>
+          </a:prstGeom>
+        </p:spPr>
+      </p:pic>
+      <p:sp>
+        <p:nvSpPr>
+          <p:cNvPr id="9" name="TextBox 8">
+            <a:extLst>
+              <a:ext uri="{FF2B5EF4-FFF2-40B4-BE49-F238E27FC236}">
+                <a16:creationId xmlns:a16="http://schemas.microsoft.com/office/drawing/2014/main" id="{EC0FB1E0-3439-504E-9FAD-BD9556D4FFCA}"/>
+              </a:ext>
+            </a:extLst>
+          </p:cNvPr>
+          <p:cNvSpPr txBox="1"/>
+          <p:nvPr/>
+        </p:nvSpPr>
+        <p:spPr>
+          <a:xfrm>
+            <a:off x="4798540" y="1877828"/>
+            <a:ext cx="2594920" cy="369332"/>
+          </a:xfrm>
+          <a:prstGeom prst="rect">
+            <a:avLst/>
+          </a:prstGeom>
+          <a:noFill/>
+        </p:spPr>
+        <p:txBody>
+          <a:bodyPr wrap="square" rtlCol="0">
+            <a:spAutoFit/>
+          </a:bodyPr>
+          <a:lstStyle/>
+          <a:p>
+            <a:pPr algn="ctr"/>
+            <a:r>
+              <a:rPr lang="en-US" dirty="0"/>
+              <a:t>Python type annotation:</a:t>
+            </a:r>
+          </a:p>
+        </p:txBody>
+      </p:sp>
+      <p:sp>
+        <p:nvSpPr>
+          <p:cNvPr id="10" name="TextBox 9">
+            <a:extLst>
+              <a:ext uri="{FF2B5EF4-FFF2-40B4-BE49-F238E27FC236}">
+                <a16:creationId xmlns:a16="http://schemas.microsoft.com/office/drawing/2014/main" id="{0666E5BD-107C-414F-8D10-F3A5FF69B2CA}"/>
+              </a:ext>
+            </a:extLst>
+          </p:cNvPr>
+          <p:cNvSpPr txBox="1"/>
+          <p:nvPr/>
+        </p:nvSpPr>
+        <p:spPr>
+          <a:xfrm>
+            <a:off x="2295939" y="4164387"/>
+            <a:ext cx="7600122" cy="369332"/>
+          </a:xfrm>
+          <a:prstGeom prst="rect">
+            <a:avLst/>
+          </a:prstGeom>
+          <a:noFill/>
+        </p:spPr>
+        <p:txBody>
+          <a:bodyPr wrap="square" rtlCol="0">
+            <a:spAutoFit/>
+          </a:bodyPr>
+          <a:lstStyle/>
+          <a:p>
+            <a:pPr algn="ctr"/>
+            <a:r>
+              <a:rPr lang="en-US" dirty="0"/>
+              <a:t>The feature that broke Guido: Assignment Operator (coming in Python 3.8)</a:t>
+            </a:r>
+          </a:p>
+        </p:txBody>
+      </p:sp>
+      <p:pic>
+        <p:nvPicPr>
+          <p:cNvPr id="14" name="Content Placeholder 13">
+            <a:extLst>
+              <a:ext uri="{FF2B5EF4-FFF2-40B4-BE49-F238E27FC236}">
+                <a16:creationId xmlns:a16="http://schemas.microsoft.com/office/drawing/2014/main" id="{7C06868A-6270-AC44-9C46-850D3C0F537C}"/>
+              </a:ext>
+            </a:extLst>
+          </p:cNvPr>
+          <p:cNvPicPr>
+            <a:picLocks noGrp="1" noChangeAspect="1"/>
+          </p:cNvPicPr>
+          <p:nvPr>
+            <p:ph idx="1"/>
+          </p:nvPr>
+        </p:nvPicPr>
+        <p:blipFill>
+          <a:blip r:embed="rId3"/>
+          <a:stretch>
+            <a:fillRect/>
+          </a:stretch>
+        </p:blipFill>
+        <p:spPr>
+          <a:xfrm>
+            <a:off x="1828800" y="4624575"/>
+            <a:ext cx="8534400" cy="1092200"/>
+          </a:xfrm>
+        </p:spPr>
+      </p:pic>
+      <p:pic>
+        <p:nvPicPr>
+          <p:cNvPr id="4" name="Picture 3">
+            <a:extLst>
+              <a:ext uri="{FF2B5EF4-FFF2-40B4-BE49-F238E27FC236}">
+                <a16:creationId xmlns:a16="http://schemas.microsoft.com/office/drawing/2014/main" id="{CC9EA731-9103-AE4D-AF71-79F7F353641F}"/>
+              </a:ext>
+            </a:extLst>
+          </p:cNvPr>
+          <p:cNvPicPr>
+            <a:picLocks noChangeAspect="1"/>
+          </p:cNvPicPr>
+          <p:nvPr/>
+        </p:nvPicPr>
+        <p:blipFill>
+          <a:blip r:embed="rId4">
+            <a:extLst>
+              <a:ext uri="{28A0092B-C50C-407E-A947-70E740481C1C}">
+                <a14:useLocalDpi xmlns:a14="http://schemas.microsoft.com/office/drawing/2010/main" val="0"/>
+              </a:ext>
+            </a:extLst>
+          </a:blip>
+          <a:stretch>
+            <a:fillRect/>
+          </a:stretch>
+        </p:blipFill>
+        <p:spPr>
+          <a:xfrm>
+            <a:off x="9801412" y="4624575"/>
+            <a:ext cx="1552388" cy="1552388"/>
+          </a:xfrm>
+          <a:prstGeom prst="rect">
+            <a:avLst/>
+          </a:prstGeom>
+        </p:spPr>
+      </p:pic>
+    </p:spTree>
+    <p:extLst>
+      <p:ext uri="{BB962C8B-B14F-4D97-AF65-F5344CB8AC3E}">
+        <p14:creationId xmlns:p14="http://schemas.microsoft.com/office/powerpoint/2010/main" val="2415811333"/>
+      </p:ext>
+    </p:extLst>
+  </p:cSld>
+  <p:clrMapOvr>
+    <a:masterClrMapping/>
+  </p:clrMapOvr>
+</p:sld>
+</file>
+
+<file path=ppt/slides/slide12.xml><?xml version="1.0" encoding="utf-8"?>
+<p:sld xmlns:a="http://schemas.openxmlformats.org/drawingml/2006/main" xmlns:r="http://schemas.openxmlformats.org/officeDocument/2006/relationships" xmlns:p="http://schemas.openxmlformats.org/presentationml/2006/main">
+  <p:cSld>
+    <p:spTree>
+      <p:nvGrpSpPr>
+        <p:cNvPr id="1" name=""/>
+        <p:cNvGrpSpPr/>
+        <p:nvPr/>
+      </p:nvGrpSpPr>
+      <p:grpSpPr>
+        <a:xfrm>
+          <a:off x="0" y="0"/>
+          <a:ext cx="0" cy="0"/>
+          <a:chOff x="0" y="0"/>
+          <a:chExt cx="0" cy="0"/>
+        </a:xfrm>
+      </p:grpSpPr>
+      <p:sp>
+        <p:nvSpPr>
           <p:cNvPr id="2" name="Title 1"/>
           <p:cNvSpPr>
             <a:spLocks noGrp="1"/>
@@ -4177,7 +4404,7 @@
 </p:sld>
 </file>
 
-<file path=ppt/slides/slide12.xml><?xml version="1.0" encoding="utf-8"?>
+<file path=ppt/slides/slide13.xml><?xml version="1.0" encoding="utf-8"?>
 <p:sld xmlns:a="http://schemas.openxmlformats.org/drawingml/2006/main" xmlns:r="http://schemas.openxmlformats.org/officeDocument/2006/relationships" xmlns:p="http://schemas.openxmlformats.org/presentationml/2006/main">
   <p:cSld>
     <p:spTree>
@@ -4364,7 +4591,7 @@
 </p:sld>
 </file>
 
-<file path=ppt/slides/slide13.xml><?xml version="1.0" encoding="utf-8"?>
+<file path=ppt/slides/slide14.xml><?xml version="1.0" encoding="utf-8"?>
 <p:sld xmlns:a="http://schemas.openxmlformats.org/drawingml/2006/main" xmlns:r="http://schemas.openxmlformats.org/officeDocument/2006/relationships" xmlns:p="http://schemas.openxmlformats.org/presentationml/2006/main">
   <p:cSld>
     <p:spTree>
@@ -4707,7 +4934,7 @@
 </p:sld>
 </file>
 
-<file path=ppt/slides/slide14.xml><?xml version="1.0" encoding="utf-8"?>
+<file path=ppt/slides/slide15.xml><?xml version="1.0" encoding="utf-8"?>
 <p:sld xmlns:a="http://schemas.openxmlformats.org/drawingml/2006/main" xmlns:r="http://schemas.openxmlformats.org/officeDocument/2006/relationships" xmlns:p="http://schemas.openxmlformats.org/presentationml/2006/main">
   <p:cSld>
     <p:spTree>

</xml_diff>